<commit_message>
update to class content
</commit_message>
<xml_diff>
--- a/How to use Python.pptx
+++ b/How to use Python.pptx
@@ -17,17 +17,18 @@
     <p:sldId id="262" r:id="rId11"/>
     <p:sldId id="267" r:id="rId12"/>
     <p:sldId id="268" r:id="rId13"/>
-    <p:sldId id="269" r:id="rId14"/>
-    <p:sldId id="270" r:id="rId15"/>
-    <p:sldId id="271" r:id="rId16"/>
-    <p:sldId id="272" r:id="rId17"/>
-    <p:sldId id="274" r:id="rId18"/>
-    <p:sldId id="273" r:id="rId19"/>
-    <p:sldId id="279" r:id="rId20"/>
-    <p:sldId id="275" r:id="rId21"/>
-    <p:sldId id="276" r:id="rId22"/>
-    <p:sldId id="277" r:id="rId23"/>
-    <p:sldId id="278" r:id="rId24"/>
+    <p:sldId id="281" r:id="rId14"/>
+    <p:sldId id="269" r:id="rId15"/>
+    <p:sldId id="270" r:id="rId16"/>
+    <p:sldId id="271" r:id="rId17"/>
+    <p:sldId id="272" r:id="rId18"/>
+    <p:sldId id="274" r:id="rId19"/>
+    <p:sldId id="273" r:id="rId20"/>
+    <p:sldId id="279" r:id="rId21"/>
+    <p:sldId id="275" r:id="rId22"/>
+    <p:sldId id="276" r:id="rId23"/>
+    <p:sldId id="277" r:id="rId24"/>
+    <p:sldId id="278" r:id="rId25"/>
   </p:sldIdLst>
   <p:sldSz cx="12192000" cy="6858000"/>
   <p:notesSz cx="6858000" cy="9144000"/>
@@ -281,7 +282,7 @@
           <a:p>
             <a:fld id="{783CD771-E527-0B44-BA3C-FA5AD0F40365}" type="datetimeFigureOut">
               <a:rPr lang="en-US" smtClean="0"/>
-              <a:t>12/20/25</a:t>
+              <a:t>1/12/26</a:t>
             </a:fld>
             <a:endParaRPr lang="en-US"/>
           </a:p>
@@ -479,7 +480,7 @@
           <a:p>
             <a:fld id="{783CD771-E527-0B44-BA3C-FA5AD0F40365}" type="datetimeFigureOut">
               <a:rPr lang="en-US" smtClean="0"/>
-              <a:t>12/20/25</a:t>
+              <a:t>1/12/26</a:t>
             </a:fld>
             <a:endParaRPr lang="en-US"/>
           </a:p>
@@ -687,7 +688,7 @@
           <a:p>
             <a:fld id="{783CD771-E527-0B44-BA3C-FA5AD0F40365}" type="datetimeFigureOut">
               <a:rPr lang="en-US" smtClean="0"/>
-              <a:t>12/20/25</a:t>
+              <a:t>1/12/26</a:t>
             </a:fld>
             <a:endParaRPr lang="en-US"/>
           </a:p>
@@ -885,7 +886,7 @@
           <a:p>
             <a:fld id="{783CD771-E527-0B44-BA3C-FA5AD0F40365}" type="datetimeFigureOut">
               <a:rPr lang="en-US" smtClean="0"/>
-              <a:t>12/20/25</a:t>
+              <a:t>1/12/26</a:t>
             </a:fld>
             <a:endParaRPr lang="en-US"/>
           </a:p>
@@ -1160,7 +1161,7 @@
           <a:p>
             <a:fld id="{783CD771-E527-0B44-BA3C-FA5AD0F40365}" type="datetimeFigureOut">
               <a:rPr lang="en-US" smtClean="0"/>
-              <a:t>12/20/25</a:t>
+              <a:t>1/12/26</a:t>
             </a:fld>
             <a:endParaRPr lang="en-US"/>
           </a:p>
@@ -1425,7 +1426,7 @@
           <a:p>
             <a:fld id="{783CD771-E527-0B44-BA3C-FA5AD0F40365}" type="datetimeFigureOut">
               <a:rPr lang="en-US" smtClean="0"/>
-              <a:t>12/20/25</a:t>
+              <a:t>1/12/26</a:t>
             </a:fld>
             <a:endParaRPr lang="en-US"/>
           </a:p>
@@ -1837,7 +1838,7 @@
           <a:p>
             <a:fld id="{783CD771-E527-0B44-BA3C-FA5AD0F40365}" type="datetimeFigureOut">
               <a:rPr lang="en-US" smtClean="0"/>
-              <a:t>12/20/25</a:t>
+              <a:t>1/12/26</a:t>
             </a:fld>
             <a:endParaRPr lang="en-US"/>
           </a:p>
@@ -1978,7 +1979,7 @@
           <a:p>
             <a:fld id="{783CD771-E527-0B44-BA3C-FA5AD0F40365}" type="datetimeFigureOut">
               <a:rPr lang="en-US" smtClean="0"/>
-              <a:t>12/20/25</a:t>
+              <a:t>1/12/26</a:t>
             </a:fld>
             <a:endParaRPr lang="en-US"/>
           </a:p>
@@ -2091,7 +2092,7 @@
           <a:p>
             <a:fld id="{783CD771-E527-0B44-BA3C-FA5AD0F40365}" type="datetimeFigureOut">
               <a:rPr lang="en-US" smtClean="0"/>
-              <a:t>12/20/25</a:t>
+              <a:t>1/12/26</a:t>
             </a:fld>
             <a:endParaRPr lang="en-US"/>
           </a:p>
@@ -2402,7 +2403,7 @@
           <a:p>
             <a:fld id="{783CD771-E527-0B44-BA3C-FA5AD0F40365}" type="datetimeFigureOut">
               <a:rPr lang="en-US" smtClean="0"/>
-              <a:t>12/20/25</a:t>
+              <a:t>1/12/26</a:t>
             </a:fld>
             <a:endParaRPr lang="en-US"/>
           </a:p>
@@ -2690,7 +2691,7 @@
           <a:p>
             <a:fld id="{783CD771-E527-0B44-BA3C-FA5AD0F40365}" type="datetimeFigureOut">
               <a:rPr lang="en-US" smtClean="0"/>
-              <a:t>12/20/25</a:t>
+              <a:t>1/12/26</a:t>
             </a:fld>
             <a:endParaRPr lang="en-US"/>
           </a:p>
@@ -2931,7 +2932,7 @@
           <a:p>
             <a:fld id="{783CD771-E527-0B44-BA3C-FA5AD0F40365}" type="datetimeFigureOut">
               <a:rPr lang="en-US" smtClean="0"/>
-              <a:t>12/20/25</a:t>
+              <a:t>1/12/26</a:t>
             </a:fld>
             <a:endParaRPr lang="en-US"/>
           </a:p>
@@ -3925,7 +3926,7 @@
             </a:pPr>
             <a:r>
               <a:rPr lang="en-US" dirty="0"/>
-              <a:t>Note-&gt; avoid using spaces in the folder’s name, for example, “AI for Movement Sciences” should be avoided and use “</a:t>
+              <a:t>Note-&gt; avoid using spaces in the folder’s name, for example, “AI for Movement Sciences” should be “</a:t>
             </a:r>
             <a:r>
               <a:rPr lang="en-US" dirty="0" err="1"/>
@@ -3933,7 +3934,7 @@
             </a:r>
             <a:r>
               <a:rPr lang="en-US" dirty="0"/>
-              <a:t>” instead. </a:t>
+              <a:t>”</a:t>
             </a:r>
           </a:p>
         </p:txBody>
@@ -4108,6 +4109,172 @@
   <p:cSld>
     <p:spTree>
       <p:nvGrpSpPr>
+        <p:cNvPr id="1" name="">
+          <a:extLst>
+            <a:ext uri="{FF2B5EF4-FFF2-40B4-BE49-F238E27FC236}">
+              <a16:creationId xmlns:a16="http://schemas.microsoft.com/office/drawing/2014/main" id="{B02FFA7E-2EB8-94DB-61D0-F8472F3DAE3C}"/>
+            </a:ext>
+          </a:extLst>
+        </p:cNvPr>
+        <p:cNvGrpSpPr/>
+        <p:nvPr/>
+      </p:nvGrpSpPr>
+      <p:grpSpPr>
+        <a:xfrm>
+          <a:off x="0" y="0"/>
+          <a:ext cx="0" cy="0"/>
+          <a:chOff x="0" y="0"/>
+          <a:chExt cx="0" cy="0"/>
+        </a:xfrm>
+      </p:grpSpPr>
+      <p:sp>
+        <p:nvSpPr>
+          <p:cNvPr id="2" name="Title 1">
+            <a:extLst>
+              <a:ext uri="{FF2B5EF4-FFF2-40B4-BE49-F238E27FC236}">
+                <a16:creationId xmlns:a16="http://schemas.microsoft.com/office/drawing/2014/main" id="{381E295A-AABA-2F5A-CE06-A84AFDDE0B06}"/>
+              </a:ext>
+            </a:extLst>
+          </p:cNvPr>
+          <p:cNvSpPr>
+            <a:spLocks noGrp="1"/>
+          </p:cNvSpPr>
+          <p:nvPr>
+            <p:ph type="title"/>
+          </p:nvPr>
+        </p:nvSpPr>
+        <p:spPr/>
+        <p:txBody>
+          <a:bodyPr/>
+          <a:lstStyle/>
+          <a:p>
+            <a:r>
+              <a:rPr lang="en-US" dirty="0"/>
+              <a:t>Introduction to Python</a:t>
+            </a:r>
+          </a:p>
+        </p:txBody>
+      </p:sp>
+      <p:sp>
+        <p:nvSpPr>
+          <p:cNvPr id="3" name="Content Placeholder 2">
+            <a:extLst>
+              <a:ext uri="{FF2B5EF4-FFF2-40B4-BE49-F238E27FC236}">
+                <a16:creationId xmlns:a16="http://schemas.microsoft.com/office/drawing/2014/main" id="{8B983711-ECBC-D8EF-3FD4-32A902925CE9}"/>
+              </a:ext>
+            </a:extLst>
+          </p:cNvPr>
+          <p:cNvSpPr>
+            <a:spLocks noGrp="1"/>
+          </p:cNvSpPr>
+          <p:nvPr>
+            <p:ph idx="1"/>
+          </p:nvPr>
+        </p:nvSpPr>
+        <p:spPr/>
+        <p:txBody>
+          <a:bodyPr/>
+          <a:lstStyle/>
+          <a:p>
+            <a:pPr marL="0" indent="0">
+              <a:buNone/>
+            </a:pPr>
+            <a:r>
+              <a:rPr lang="en-US" dirty="0"/>
+              <a:t>How to use Python locally?</a:t>
+            </a:r>
+          </a:p>
+          <a:p>
+            <a:pPr marL="0" indent="0">
+              <a:buNone/>
+            </a:pPr>
+            <a:endParaRPr lang="en-US" dirty="0"/>
+          </a:p>
+          <a:p>
+            <a:pPr marL="0" indent="0">
+              <a:buNone/>
+            </a:pPr>
+            <a:r>
+              <a:rPr lang="en-US" dirty="0"/>
+              <a:t>Type ‘</a:t>
+            </a:r>
+            <a:r>
+              <a:rPr lang="en-US" dirty="0" err="1"/>
+              <a:t>jupyter</a:t>
+            </a:r>
+            <a:r>
+              <a:rPr lang="en-US" dirty="0"/>
+              <a:t> notebook’ in the terminal and press Enter</a:t>
+            </a:r>
+          </a:p>
+          <a:p>
+            <a:pPr marL="0" indent="0">
+              <a:buNone/>
+            </a:pPr>
+            <a:endParaRPr lang="en-US" dirty="0"/>
+          </a:p>
+          <a:p>
+            <a:pPr marL="0" indent="0">
+              <a:buNone/>
+            </a:pPr>
+            <a:endParaRPr lang="en-US" dirty="0"/>
+          </a:p>
+          <a:p>
+            <a:pPr marL="0" indent="0">
+              <a:buNone/>
+            </a:pPr>
+            <a:endParaRPr lang="en-US" dirty="0"/>
+          </a:p>
+        </p:txBody>
+      </p:sp>
+      <p:pic>
+        <p:nvPicPr>
+          <p:cNvPr id="5" name="Picture 4" descr="A screenshot of a computer showing the Terminal program ">
+            <a:extLst>
+              <a:ext uri="{FF2B5EF4-FFF2-40B4-BE49-F238E27FC236}">
+                <a16:creationId xmlns:a16="http://schemas.microsoft.com/office/drawing/2014/main" id="{30FC740E-7DE2-0EF2-56F8-C935261D7784}"/>
+              </a:ext>
+            </a:extLst>
+          </p:cNvPr>
+          <p:cNvPicPr>
+            <a:picLocks noChangeAspect="1"/>
+          </p:cNvPicPr>
+          <p:nvPr/>
+        </p:nvPicPr>
+        <p:blipFill>
+          <a:blip r:embed="rId2"/>
+          <a:stretch>
+            <a:fillRect/>
+          </a:stretch>
+        </p:blipFill>
+        <p:spPr>
+          <a:xfrm>
+            <a:off x="0" y="3429000"/>
+            <a:ext cx="12192000" cy="2051409"/>
+          </a:xfrm>
+          <a:prstGeom prst="rect">
+            <a:avLst/>
+          </a:prstGeom>
+        </p:spPr>
+      </p:pic>
+    </p:spTree>
+    <p:extLst>
+      <p:ext uri="{BB962C8B-B14F-4D97-AF65-F5344CB8AC3E}">
+        <p14:creationId xmlns:p14="http://schemas.microsoft.com/office/powerpoint/2010/main" val="1189071561"/>
+      </p:ext>
+    </p:extLst>
+  </p:cSld>
+  <p:clrMapOvr>
+    <a:masterClrMapping/>
+  </p:clrMapOvr>
+</p:sld>
+</file>
+
+<file path=ppt/slides/slide14.xml><?xml version="1.0" encoding="utf-8"?>
+<p:sld xmlns:a="http://schemas.openxmlformats.org/drawingml/2006/main" xmlns:r="http://schemas.openxmlformats.org/officeDocument/2006/relationships" xmlns:p="http://schemas.openxmlformats.org/presentationml/2006/main">
+  <p:cSld>
+    <p:spTree>
+      <p:nvGrpSpPr>
         <p:cNvPr id="1" name=""/>
         <p:cNvGrpSpPr/>
         <p:nvPr/>
@@ -4197,7 +4364,7 @@
             </a:r>
             <a:r>
               <a:rPr lang="en-US" dirty="0"/>
-              <a:t> Notebooks </a:t>
+              <a:t> Notebook </a:t>
             </a:r>
           </a:p>
           <a:p>
@@ -4257,7 +4424,7 @@
 </p:sld>
 </file>
 
-<file path=ppt/slides/slide14.xml><?xml version="1.0" encoding="utf-8"?>
+<file path=ppt/slides/slide15.xml><?xml version="1.0" encoding="utf-8"?>
 <p:sld xmlns:a="http://schemas.openxmlformats.org/drawingml/2006/main" xmlns:r="http://schemas.openxmlformats.org/officeDocument/2006/relationships" xmlns:p="http://schemas.openxmlformats.org/presentationml/2006/main">
   <p:cSld>
     <p:spTree>
@@ -4391,7 +4558,7 @@
 </p:sld>
 </file>
 
-<file path=ppt/slides/slide15.xml><?xml version="1.0" encoding="utf-8"?>
+<file path=ppt/slides/slide16.xml><?xml version="1.0" encoding="utf-8"?>
 <p:sld xmlns:a="http://schemas.openxmlformats.org/drawingml/2006/main" xmlns:r="http://schemas.openxmlformats.org/officeDocument/2006/relationships" xmlns:p="http://schemas.openxmlformats.org/presentationml/2006/main">
   <p:cSld>
     <p:spTree>
@@ -4454,7 +4621,9 @@
         </p:nvSpPr>
         <p:spPr/>
         <p:txBody>
-          <a:bodyPr/>
+          <a:bodyPr>
+            <a:normAutofit lnSpcReduction="10000"/>
+          </a:bodyPr>
           <a:lstStyle/>
           <a:p>
             <a:pPr marL="0" indent="0">
@@ -4518,7 +4687,7 @@
             </a:pPr>
             <a:r>
               <a:rPr lang="en-US" dirty="0"/>
-              <a:t>Click on Untitled and adjust the file name, for instance, to Example</a:t>
+              <a:t>Click on Untitled and change the file name, for instance, to “Example”</a:t>
             </a:r>
           </a:p>
         </p:txBody>
@@ -4566,7 +4735,7 @@
 </p:sld>
 </file>
 
-<file path=ppt/slides/slide16.xml><?xml version="1.0" encoding="utf-8"?>
+<file path=ppt/slides/slide17.xml><?xml version="1.0" encoding="utf-8"?>
 <p:sld xmlns:a="http://schemas.openxmlformats.org/drawingml/2006/main" xmlns:r="http://schemas.openxmlformats.org/officeDocument/2006/relationships" xmlns:p="http://schemas.openxmlformats.org/presentationml/2006/main">
   <p:cSld>
     <p:spTree>
@@ -4714,7 +4883,7 @@
 </p:sld>
 </file>
 
-<file path=ppt/slides/slide17.xml><?xml version="1.0" encoding="utf-8"?>
+<file path=ppt/slides/slide18.xml><?xml version="1.0" encoding="utf-8"?>
 <p:sld xmlns:a="http://schemas.openxmlformats.org/drawingml/2006/main" xmlns:r="http://schemas.openxmlformats.org/officeDocument/2006/relationships" xmlns:p="http://schemas.openxmlformats.org/presentationml/2006/main">
   <p:cSld>
     <p:spTree>
@@ -4850,7 +5019,7 @@
 </p:sld>
 </file>
 
-<file path=ppt/slides/slide18.xml><?xml version="1.0" encoding="utf-8"?>
+<file path=ppt/slides/slide19.xml><?xml version="1.0" encoding="utf-8"?>
 <p:sld xmlns:a="http://schemas.openxmlformats.org/drawingml/2006/main" xmlns:r="http://schemas.openxmlformats.org/officeDocument/2006/relationships" xmlns:p="http://schemas.openxmlformats.org/presentationml/2006/main">
   <p:cSld>
     <p:spTree>
@@ -4942,7 +5111,7 @@
             </a:r>
             <a:r>
               <a:rPr lang="en-US" dirty="0"/>
-              <a:t> Notebooks is an Integrated Development Environment (IDE) that helps you run and visualize your Python code. But they </a:t>
+              <a:t> Notebooks is an Integrated Development Environment (IDE) that helps you run and visualize your Python code. But  </a:t>
             </a:r>
             <a:r>
               <a:rPr lang="en-US" dirty="0" err="1"/>
@@ -5004,174 +5173,6 @@
     <p:extLst>
       <p:ext uri="{BB962C8B-B14F-4D97-AF65-F5344CB8AC3E}">
         <p14:creationId xmlns:p14="http://schemas.microsoft.com/office/powerpoint/2010/main" val="3867007374"/>
-      </p:ext>
-    </p:extLst>
-  </p:cSld>
-  <p:clrMapOvr>
-    <a:masterClrMapping/>
-  </p:clrMapOvr>
-</p:sld>
-</file>
-
-<file path=ppt/slides/slide19.xml><?xml version="1.0" encoding="utf-8"?>
-<p:sld xmlns:a="http://schemas.openxmlformats.org/drawingml/2006/main" xmlns:r="http://schemas.openxmlformats.org/officeDocument/2006/relationships" xmlns:p="http://schemas.openxmlformats.org/presentationml/2006/main">
-  <p:cSld>
-    <p:spTree>
-      <p:nvGrpSpPr>
-        <p:cNvPr id="1" name="">
-          <a:extLst>
-            <a:ext uri="{FF2B5EF4-FFF2-40B4-BE49-F238E27FC236}">
-              <a16:creationId xmlns:a16="http://schemas.microsoft.com/office/drawing/2014/main" id="{37D2779B-FD5B-1857-3B01-DCD45C039B95}"/>
-            </a:ext>
-          </a:extLst>
-        </p:cNvPr>
-        <p:cNvGrpSpPr/>
-        <p:nvPr/>
-      </p:nvGrpSpPr>
-      <p:grpSpPr>
-        <a:xfrm>
-          <a:off x="0" y="0"/>
-          <a:ext cx="0" cy="0"/>
-          <a:chOff x="0" y="0"/>
-          <a:chExt cx="0" cy="0"/>
-        </a:xfrm>
-      </p:grpSpPr>
-      <p:sp>
-        <p:nvSpPr>
-          <p:cNvPr id="2" name="Title 1">
-            <a:extLst>
-              <a:ext uri="{FF2B5EF4-FFF2-40B4-BE49-F238E27FC236}">
-                <a16:creationId xmlns:a16="http://schemas.microsoft.com/office/drawing/2014/main" id="{1C09B9AB-B68A-2F0A-F491-FE6795A49763}"/>
-              </a:ext>
-            </a:extLst>
-          </p:cNvPr>
-          <p:cNvSpPr>
-            <a:spLocks noGrp="1"/>
-          </p:cNvSpPr>
-          <p:nvPr>
-            <p:ph type="title"/>
-          </p:nvPr>
-        </p:nvSpPr>
-        <p:spPr/>
-        <p:txBody>
-          <a:bodyPr/>
-          <a:lstStyle/>
-          <a:p>
-            <a:r>
-              <a:rPr lang="en-US" dirty="0"/>
-              <a:t>Introduction to Python</a:t>
-            </a:r>
-          </a:p>
-        </p:txBody>
-      </p:sp>
-      <p:sp>
-        <p:nvSpPr>
-          <p:cNvPr id="3" name="Content Placeholder 2">
-            <a:extLst>
-              <a:ext uri="{FF2B5EF4-FFF2-40B4-BE49-F238E27FC236}">
-                <a16:creationId xmlns:a16="http://schemas.microsoft.com/office/drawing/2014/main" id="{3E146454-0700-C8B0-B5C7-EFD666D9D0FE}"/>
-              </a:ext>
-            </a:extLst>
-          </p:cNvPr>
-          <p:cNvSpPr>
-            <a:spLocks noGrp="1"/>
-          </p:cNvSpPr>
-          <p:nvPr>
-            <p:ph idx="1"/>
-          </p:nvPr>
-        </p:nvSpPr>
-        <p:spPr/>
-        <p:txBody>
-          <a:bodyPr>
-            <a:normAutofit/>
-          </a:bodyPr>
-          <a:lstStyle/>
-          <a:p>
-            <a:pPr marL="0" indent="0">
-              <a:buNone/>
-            </a:pPr>
-            <a:r>
-              <a:rPr lang="en-US" dirty="0"/>
-              <a:t>How to use Python locally?</a:t>
-            </a:r>
-          </a:p>
-          <a:p>
-            <a:pPr marL="0" indent="0">
-              <a:buNone/>
-            </a:pPr>
-            <a:endParaRPr lang="en-US" dirty="0"/>
-          </a:p>
-          <a:p>
-            <a:pPr marL="0" indent="0">
-              <a:buNone/>
-            </a:pPr>
-            <a:r>
-              <a:rPr lang="en-US" dirty="0"/>
-              <a:t>Disclaimer:</a:t>
-            </a:r>
-          </a:p>
-          <a:p>
-            <a:pPr marL="0" indent="0">
-              <a:buNone/>
-            </a:pPr>
-            <a:r>
-              <a:rPr lang="en-US" dirty="0"/>
-              <a:t>I personally don’t use </a:t>
-            </a:r>
-            <a:r>
-              <a:rPr lang="en-US" dirty="0" err="1"/>
-              <a:t>Jupyter</a:t>
-            </a:r>
-            <a:r>
-              <a:rPr lang="en-US" dirty="0"/>
-              <a:t> Notebook directly, rather, I use another IDE called </a:t>
-            </a:r>
-            <a:r>
-              <a:rPr lang="en-US" dirty="0" err="1"/>
-              <a:t>VSCode</a:t>
-            </a:r>
-            <a:r>
-              <a:rPr lang="en-US" dirty="0"/>
-              <a:t>, which is nicely integrated with many other tools. </a:t>
-            </a:r>
-          </a:p>
-          <a:p>
-            <a:pPr marL="0" indent="0">
-              <a:buNone/>
-            </a:pPr>
-            <a:r>
-              <a:rPr lang="en-US" dirty="0"/>
-              <a:t>You can ‘graduate’ to </a:t>
-            </a:r>
-            <a:r>
-              <a:rPr lang="en-US" dirty="0" err="1"/>
-              <a:t>VSCode</a:t>
-            </a:r>
-            <a:r>
-              <a:rPr lang="en-US" dirty="0"/>
-              <a:t> once you are comfortable with </a:t>
-            </a:r>
-            <a:r>
-              <a:rPr lang="en-US" dirty="0" err="1"/>
-              <a:t>Jupyter</a:t>
-            </a:r>
-            <a:r>
-              <a:rPr lang="en-US" dirty="0"/>
-              <a:t> Notebooks. </a:t>
-            </a:r>
-          </a:p>
-          <a:p>
-            <a:pPr marL="0" indent="0">
-              <a:buNone/>
-            </a:pPr>
-            <a:endParaRPr lang="en-US" dirty="0"/>
-          </a:p>
-        </p:txBody>
-      </p:sp>
-    </p:spTree>
-    <p:extLst>
-      <p:ext uri="{BB962C8B-B14F-4D97-AF65-F5344CB8AC3E}">
-        <p14:creationId xmlns:p14="http://schemas.microsoft.com/office/powerpoint/2010/main" val="363773284"/>
       </p:ext>
     </p:extLst>
   </p:cSld>
@@ -5287,7 +5288,7 @@
             </a:pPr>
             <a:r>
               <a:rPr lang="en-US" dirty="0"/>
-              <a:t>Python has become the default programming language for data science applications. Python and its many libraries are used in thousands of data science projects. Everyone, from students to billion-dollar corporations, use Python.</a:t>
+              <a:t>Python is now the default programming language for data science applications. Python and its many libraries are used in thousands of data science projects. Everyone, from students to billion-dollar corporations, use Python.</a:t>
             </a:r>
           </a:p>
         </p:txBody>
@@ -5310,6 +5311,174 @@
   <p:cSld>
     <p:spTree>
       <p:nvGrpSpPr>
+        <p:cNvPr id="1" name="">
+          <a:extLst>
+            <a:ext uri="{FF2B5EF4-FFF2-40B4-BE49-F238E27FC236}">
+              <a16:creationId xmlns:a16="http://schemas.microsoft.com/office/drawing/2014/main" id="{37D2779B-FD5B-1857-3B01-DCD45C039B95}"/>
+            </a:ext>
+          </a:extLst>
+        </p:cNvPr>
+        <p:cNvGrpSpPr/>
+        <p:nvPr/>
+      </p:nvGrpSpPr>
+      <p:grpSpPr>
+        <a:xfrm>
+          <a:off x="0" y="0"/>
+          <a:ext cx="0" cy="0"/>
+          <a:chOff x="0" y="0"/>
+          <a:chExt cx="0" cy="0"/>
+        </a:xfrm>
+      </p:grpSpPr>
+      <p:sp>
+        <p:nvSpPr>
+          <p:cNvPr id="2" name="Title 1">
+            <a:extLst>
+              <a:ext uri="{FF2B5EF4-FFF2-40B4-BE49-F238E27FC236}">
+                <a16:creationId xmlns:a16="http://schemas.microsoft.com/office/drawing/2014/main" id="{1C09B9AB-B68A-2F0A-F491-FE6795A49763}"/>
+              </a:ext>
+            </a:extLst>
+          </p:cNvPr>
+          <p:cNvSpPr>
+            <a:spLocks noGrp="1"/>
+          </p:cNvSpPr>
+          <p:nvPr>
+            <p:ph type="title"/>
+          </p:nvPr>
+        </p:nvSpPr>
+        <p:spPr/>
+        <p:txBody>
+          <a:bodyPr/>
+          <a:lstStyle/>
+          <a:p>
+            <a:r>
+              <a:rPr lang="en-US" dirty="0"/>
+              <a:t>Introduction to Python</a:t>
+            </a:r>
+          </a:p>
+        </p:txBody>
+      </p:sp>
+      <p:sp>
+        <p:nvSpPr>
+          <p:cNvPr id="3" name="Content Placeholder 2">
+            <a:extLst>
+              <a:ext uri="{FF2B5EF4-FFF2-40B4-BE49-F238E27FC236}">
+                <a16:creationId xmlns:a16="http://schemas.microsoft.com/office/drawing/2014/main" id="{3E146454-0700-C8B0-B5C7-EFD666D9D0FE}"/>
+              </a:ext>
+            </a:extLst>
+          </p:cNvPr>
+          <p:cNvSpPr>
+            <a:spLocks noGrp="1"/>
+          </p:cNvSpPr>
+          <p:nvPr>
+            <p:ph idx="1"/>
+          </p:nvPr>
+        </p:nvSpPr>
+        <p:spPr/>
+        <p:txBody>
+          <a:bodyPr>
+            <a:normAutofit/>
+          </a:bodyPr>
+          <a:lstStyle/>
+          <a:p>
+            <a:pPr marL="0" indent="0">
+              <a:buNone/>
+            </a:pPr>
+            <a:r>
+              <a:rPr lang="en-US" dirty="0"/>
+              <a:t>How to use Python locally?</a:t>
+            </a:r>
+          </a:p>
+          <a:p>
+            <a:pPr marL="0" indent="0">
+              <a:buNone/>
+            </a:pPr>
+            <a:endParaRPr lang="en-US" dirty="0"/>
+          </a:p>
+          <a:p>
+            <a:pPr marL="0" indent="0">
+              <a:buNone/>
+            </a:pPr>
+            <a:r>
+              <a:rPr lang="en-US" dirty="0"/>
+              <a:t>Disclaimer:</a:t>
+            </a:r>
+          </a:p>
+          <a:p>
+            <a:pPr marL="0" indent="0">
+              <a:buNone/>
+            </a:pPr>
+            <a:r>
+              <a:rPr lang="en-US" dirty="0"/>
+              <a:t>I personally don’t use </a:t>
+            </a:r>
+            <a:r>
+              <a:rPr lang="en-US" dirty="0" err="1"/>
+              <a:t>Jupyter</a:t>
+            </a:r>
+            <a:r>
+              <a:rPr lang="en-US" dirty="0"/>
+              <a:t> Notebook directly, rather, I use another IDE called </a:t>
+            </a:r>
+            <a:r>
+              <a:rPr lang="en-US" dirty="0" err="1"/>
+              <a:t>VSCode</a:t>
+            </a:r>
+            <a:r>
+              <a:rPr lang="en-US" dirty="0"/>
+              <a:t>, which is nicely integrated with many other tools. </a:t>
+            </a:r>
+          </a:p>
+          <a:p>
+            <a:pPr marL="0" indent="0">
+              <a:buNone/>
+            </a:pPr>
+            <a:r>
+              <a:rPr lang="en-US" dirty="0"/>
+              <a:t>You can ‘graduate’ to </a:t>
+            </a:r>
+            <a:r>
+              <a:rPr lang="en-US" dirty="0" err="1"/>
+              <a:t>VSCode</a:t>
+            </a:r>
+            <a:r>
+              <a:rPr lang="en-US" dirty="0"/>
+              <a:t> once you are comfortable with </a:t>
+            </a:r>
+            <a:r>
+              <a:rPr lang="en-US" dirty="0" err="1"/>
+              <a:t>Jupyter</a:t>
+            </a:r>
+            <a:r>
+              <a:rPr lang="en-US" dirty="0"/>
+              <a:t> Notebooks. </a:t>
+            </a:r>
+          </a:p>
+          <a:p>
+            <a:pPr marL="0" indent="0">
+              <a:buNone/>
+            </a:pPr>
+            <a:endParaRPr lang="en-US" dirty="0"/>
+          </a:p>
+        </p:txBody>
+      </p:sp>
+    </p:spTree>
+    <p:extLst>
+      <p:ext uri="{BB962C8B-B14F-4D97-AF65-F5344CB8AC3E}">
+        <p14:creationId xmlns:p14="http://schemas.microsoft.com/office/powerpoint/2010/main" val="363773284"/>
+      </p:ext>
+    </p:extLst>
+  </p:cSld>
+  <p:clrMapOvr>
+    <a:masterClrMapping/>
+  </p:clrMapOvr>
+</p:sld>
+</file>
+
+<file path=ppt/slides/slide21.xml><?xml version="1.0" encoding="utf-8"?>
+<p:sld xmlns:a="http://schemas.openxmlformats.org/drawingml/2006/main" xmlns:r="http://schemas.openxmlformats.org/officeDocument/2006/relationships" xmlns:p="http://schemas.openxmlformats.org/presentationml/2006/main">
+  <p:cSld>
+    <p:spTree>
+      <p:nvGrpSpPr>
         <p:cNvPr id="1" name=""/>
         <p:cNvGrpSpPr/>
         <p:nvPr/>
@@ -5489,7 +5658,7 @@
 </p:sld>
 </file>
 
-<file path=ppt/slides/slide21.xml><?xml version="1.0" encoding="utf-8"?>
+<file path=ppt/slides/slide22.xml><?xml version="1.0" encoding="utf-8"?>
 <p:sld xmlns:a="http://schemas.openxmlformats.org/drawingml/2006/main" xmlns:r="http://schemas.openxmlformats.org/officeDocument/2006/relationships" xmlns:p="http://schemas.openxmlformats.org/presentationml/2006/main">
   <p:cSld>
     <p:spTree>
@@ -5664,7 +5833,7 @@
 </p:sld>
 </file>
 
-<file path=ppt/slides/slide22.xml><?xml version="1.0" encoding="utf-8"?>
+<file path=ppt/slides/slide23.xml><?xml version="1.0" encoding="utf-8"?>
 <p:sld xmlns:a="http://schemas.openxmlformats.org/drawingml/2006/main" xmlns:r="http://schemas.openxmlformats.org/officeDocument/2006/relationships" xmlns:p="http://schemas.openxmlformats.org/presentationml/2006/main">
   <p:cSld>
     <p:spTree>
@@ -5807,7 +5976,7 @@
 </p:sld>
 </file>
 
-<file path=ppt/slides/slide23.xml><?xml version="1.0" encoding="utf-8"?>
+<file path=ppt/slides/slide24.xml><?xml version="1.0" encoding="utf-8"?>
 <p:sld xmlns:a="http://schemas.openxmlformats.org/drawingml/2006/main" xmlns:r="http://schemas.openxmlformats.org/officeDocument/2006/relationships" xmlns:p="http://schemas.openxmlformats.org/presentationml/2006/main">
   <p:cSld>
     <p:spTree>
@@ -6346,12 +6515,6 @@
             <a:pPr marL="0" indent="0">
               <a:buNone/>
             </a:pPr>
-            <a:endParaRPr lang="en-US" dirty="0"/>
-          </a:p>
-          <a:p>
-            <a:pPr marL="0" indent="0">
-              <a:buNone/>
-            </a:pPr>
             <a:r>
               <a:rPr lang="en-US" dirty="0"/>
               <a:t>If you </a:t>
@@ -6370,38 +6533,80 @@
             </a:r>
             <a:r>
               <a:rPr lang="en-US" dirty="0"/>
-              <a:t> and then type in terminal</a:t>
-            </a:r>
-          </a:p>
-          <a:p>
-            <a:pPr marL="0" indent="0">
-              <a:buNone/>
-            </a:pPr>
-            <a:r>
-              <a:rPr lang="en-US" dirty="0"/>
+              <a:t> and then type in the terminal</a:t>
+            </a:r>
+          </a:p>
+          <a:p>
+            <a:pPr marL="0" indent="0" algn="ctr">
+              <a:buNone/>
+            </a:pPr>
+            <a:r>
+              <a:rPr lang="en-US" sz="2400" dirty="0"/>
               <a:t>&gt;&gt; </a:t>
             </a:r>
             <a:r>
-              <a:rPr lang="en-US" dirty="0" err="1"/>
+              <a:rPr lang="en-US" sz="2400" dirty="0" err="1"/>
               <a:t>conda</a:t>
             </a:r>
             <a:r>
-              <a:rPr lang="en-US" dirty="0"/>
+              <a:rPr lang="en-US" sz="2400" dirty="0"/>
               <a:t> install </a:t>
             </a:r>
             <a:r>
-              <a:rPr lang="en-US" dirty="0" err="1"/>
+              <a:rPr lang="en-US" sz="2400" dirty="0" err="1"/>
               <a:t>numpy</a:t>
             </a:r>
             <a:r>
-              <a:rPr lang="en-US" dirty="0"/>
+              <a:rPr lang="en-US" sz="2400" dirty="0"/>
               <a:t> pandas scikit-learn matplotlib seaborn </a:t>
             </a:r>
             <a:r>
-              <a:rPr lang="en-US" dirty="0" err="1"/>
+              <a:rPr lang="en-US" sz="2400" dirty="0" err="1"/>
               <a:t>jupyter</a:t>
             </a:r>
-            <a:endParaRPr lang="en-US" dirty="0"/>
+            <a:endParaRPr lang="en-US" sz="2400" dirty="0"/>
+          </a:p>
+          <a:p>
+            <a:pPr marL="0" marR="0" lvl="0" indent="0" algn="l" defTabSz="914400" rtl="0" eaLnBrk="1" fontAlgn="auto" latinLnBrk="0" hangingPunct="1">
+              <a:lnSpc>
+                <a:spcPct val="90000"/>
+              </a:lnSpc>
+              <a:spcBef>
+                <a:spcPts val="1000"/>
+              </a:spcBef>
+              <a:spcAft>
+                <a:spcPts val="0"/>
+              </a:spcAft>
+              <a:buClrTx/>
+              <a:buSzTx/>
+              <a:buFont typeface="Arial" panose="020B0604020202020204" pitchFamily="34" charset="0"/>
+              <a:buNone/>
+              <a:tabLst/>
+              <a:defRPr/>
+            </a:pPr>
+            <a:r>
+              <a:rPr kumimoji="0" lang="en-US" sz="2800" b="0" i="0" u="none" strike="noStrike" kern="1200" cap="none" spc="0" normalizeH="0" baseline="0" noProof="0" dirty="0">
+                <a:ln>
+                  <a:noFill/>
+                </a:ln>
+                <a:solidFill>
+                  <a:prstClr val="black"/>
+                </a:solidFill>
+                <a:effectLst/>
+                <a:uLnTx/>
+                <a:uFillTx/>
+                <a:latin typeface="Aptos" panose="02110004020202020204"/>
+                <a:ea typeface="+mn-ea"/>
+                <a:cs typeface="+mn-cs"/>
+              </a:rPr>
+              <a:t>Afterwards, you will be all set to start working on your assignments. </a:t>
+            </a:r>
+          </a:p>
+          <a:p>
+            <a:pPr marL="0" indent="0">
+              <a:buNone/>
+            </a:pPr>
+            <a:endParaRPr lang="en-US" sz="1800" dirty="0"/>
           </a:p>
         </p:txBody>
       </p:sp>

</xml_diff>